<commit_message>
revised ppt with the group
</commit_message>
<xml_diff>
--- a/Project 2 - Group 4 - Spotify Top Song Presentation.pptx
+++ b/Project 2 - Group 4 - Spotify Top Song Presentation.pptx
@@ -10,6 +10,7 @@
     <p:sldId id="260" r:id="rId4"/>
     <p:sldId id="258" r:id="rId5"/>
     <p:sldId id="259" r:id="rId6"/>
+    <p:sldId id="261" r:id="rId7"/>
   </p:sldIdLst>
   <p:sldSz cx="12192000" cy="6858000"/>
   <p:notesSz cx="6858000" cy="9144000"/>
@@ -114,6 +115,32 @@
     </p:ext>
   </p:extLst>
 </p:presentation>
+</file>
+
+<file path=ppt/commentAuthors.xml><?xml version="1.0" encoding="utf-8"?>
+<p:cmAuthorLst xmlns:a="http://schemas.openxmlformats.org/drawingml/2006/main" xmlns:r="http://schemas.openxmlformats.org/officeDocument/2006/relationships" xmlns:p="http://schemas.openxmlformats.org/presentationml/2006/main">
+  <p:cmAuthor id="1" name="Christy Patrick" initials="CP" lastIdx="1" clrIdx="0">
+    <p:extLst>
+      <p:ext uri="{19B8F6BF-5375-455C-9EA6-DF929625EA0E}">
+        <p15:presenceInfo xmlns:p15="http://schemas.microsoft.com/office/powerpoint/2012/main" userId="8bf7bc2628abab3d" providerId="Windows Live"/>
+      </p:ext>
+    </p:extLst>
+  </p:cmAuthor>
+</p:cmAuthorLst>
+</file>
+
+<file path=ppt/comments/comment1.xml><?xml version="1.0" encoding="utf-8"?>
+<p:cmLst xmlns:a="http://schemas.openxmlformats.org/drawingml/2006/main" xmlns:r="http://schemas.openxmlformats.org/officeDocument/2006/relationships" xmlns:p="http://schemas.openxmlformats.org/presentationml/2006/main">
+  <p:cm authorId="1" dt="2020-12-10T19:26:34.391" idx="1">
+    <p:pos x="1554" y="1971"/>
+    <p:text>Add link to the site</p:text>
+    <p:extLst>
+      <p:ext uri="{C676402C-5697-4E1C-873F-D02D1690AC5C}">
+        <p15:threadingInfo xmlns:p15="http://schemas.microsoft.com/office/powerpoint/2012/main" timeZoneBias="360"/>
+      </p:ext>
+    </p:extLst>
+  </p:cm>
+</p:cmLst>
 </file>
 
 <file path=ppt/slideLayouts/slideLayout1.xml><?xml version="1.0" encoding="utf-8"?>
@@ -6373,7 +6400,7 @@
                 <a:latin typeface="Arial" panose="020B0604020202020204" pitchFamily="34" charset="0"/>
                 <a:cs typeface="Arial" panose="020B0604020202020204" pitchFamily="34" charset="0"/>
               </a:rPr>
-              <a:t>Analysis of the dataset examines:</a:t>
+              <a:t>Exploration of the dataset:</a:t>
             </a:r>
           </a:p>
           <a:p>
@@ -6642,7 +6669,7 @@
         </p:spPr>
         <p:txBody>
           <a:bodyPr>
-            <a:normAutofit fontScale="85000" lnSpcReduction="20000"/>
+            <a:normAutofit/>
           </a:bodyPr>
           <a:lstStyle/>
           <a:p>
@@ -6695,87 +6722,7 @@
                 <a:latin typeface="Arial" panose="020B0604020202020204" pitchFamily="34" charset="0"/>
                 <a:cs typeface="Arial" panose="020B0604020202020204" pitchFamily="34" charset="0"/>
               </a:rPr>
-              <a:t>Cleaning the data (i.e. removed select special characters and select audio types such as audio books)</a:t>
-            </a:r>
-          </a:p>
-          <a:p>
-            <a:pPr lvl="2"/>
-            <a:r>
-              <a:rPr lang="en-US" dirty="0">
-                <a:latin typeface="Arial" panose="020B0604020202020204" pitchFamily="34" charset="0"/>
-                <a:cs typeface="Arial" panose="020B0604020202020204" pitchFamily="34" charset="0"/>
-              </a:rPr>
-              <a:t>Added a column to count songs per decade</a:t>
-            </a:r>
-          </a:p>
-          <a:p>
-            <a:pPr lvl="2"/>
-            <a:r>
-              <a:rPr lang="en-US" dirty="0">
-                <a:latin typeface="Arial" panose="020B0604020202020204" pitchFamily="34" charset="0"/>
-                <a:cs typeface="Arial" panose="020B0604020202020204" pitchFamily="34" charset="0"/>
-              </a:rPr>
-              <a:t>Grouped release dates by decade</a:t>
-            </a:r>
-          </a:p>
-          <a:p>
-            <a:pPr lvl="2"/>
-            <a:r>
-              <a:rPr lang="en-US" dirty="0">
-                <a:latin typeface="Arial" panose="020B0604020202020204" pitchFamily="34" charset="0"/>
-                <a:cs typeface="Arial" panose="020B0604020202020204" pitchFamily="34" charset="0"/>
-              </a:rPr>
-              <a:t>Replace null values</a:t>
-            </a:r>
-          </a:p>
-          <a:p>
-            <a:pPr lvl="2"/>
-            <a:r>
-              <a:rPr lang="en-US" dirty="0">
-                <a:latin typeface="Arial" panose="020B0604020202020204" pitchFamily="34" charset="0"/>
-                <a:cs typeface="Arial" panose="020B0604020202020204" pitchFamily="34" charset="0"/>
-              </a:rPr>
-              <a:t>Removed unnecessary columns</a:t>
-            </a:r>
-          </a:p>
-          <a:p>
-            <a:pPr lvl="2"/>
-            <a:r>
-              <a:rPr lang="en-US" dirty="0">
-                <a:latin typeface="Arial" panose="020B0604020202020204" pitchFamily="34" charset="0"/>
-                <a:cs typeface="Arial" panose="020B0604020202020204" pitchFamily="34" charset="0"/>
-              </a:rPr>
-              <a:t>Dropped duplicates</a:t>
-            </a:r>
-          </a:p>
-          <a:p>
-            <a:pPr lvl="2"/>
-            <a:r>
-              <a:rPr lang="en-US" dirty="0">
-                <a:latin typeface="Arial" panose="020B0604020202020204" pitchFamily="34" charset="0"/>
-                <a:cs typeface="Arial" panose="020B0604020202020204" pitchFamily="34" charset="0"/>
-              </a:rPr>
-              <a:t>Rearranged the column order</a:t>
-            </a:r>
-          </a:p>
-          <a:p>
-            <a:pPr lvl="2"/>
-            <a:r>
-              <a:rPr lang="en-US" dirty="0">
-                <a:latin typeface="Arial" panose="020B0604020202020204" pitchFamily="34" charset="0"/>
-                <a:cs typeface="Arial" panose="020B0604020202020204" pitchFamily="34" charset="0"/>
-              </a:rPr>
-              <a:t>Updated column headers to proper case</a:t>
-            </a:r>
-          </a:p>
-          <a:p>
-            <a:pPr lvl="2"/>
-            <a:r>
-              <a:rPr lang="en-US" dirty="0">
-                <a:latin typeface="Arial" panose="020B0604020202020204" pitchFamily="34" charset="0"/>
-                <a:cs typeface="Arial" panose="020B0604020202020204" pitchFamily="34" charset="0"/>
-              </a:rPr>
-              <a:t>Exported the data to a master csv file</a:t>
+              <a:t>Cleaning and processing the data </a:t>
             </a:r>
           </a:p>
           <a:p>
@@ -6868,46 +6815,6 @@
           </a:effectLst>
         </p:spPr>
       </p:pic>
-      <p:sp>
-        <p:nvSpPr>
-          <p:cNvPr id="10" name="Rectangle 9">
-            <a:extLst>
-              <a:ext uri="{FF2B5EF4-FFF2-40B4-BE49-F238E27FC236}">
-                <a16:creationId xmlns:a16="http://schemas.microsoft.com/office/drawing/2014/main" id="{02B7DB00-0F0E-49F8-924A-BF9EEACB7733}"/>
-              </a:ext>
-            </a:extLst>
-          </p:cNvPr>
-          <p:cNvSpPr/>
-          <p:nvPr/>
-        </p:nvSpPr>
-        <p:spPr>
-          <a:xfrm>
-            <a:off x="0" y="1286918"/>
-            <a:ext cx="2095445" cy="369332"/>
-          </a:xfrm>
-          <a:prstGeom prst="rect">
-            <a:avLst/>
-          </a:prstGeom>
-        </p:spPr>
-        <p:txBody>
-          <a:bodyPr wrap="none">
-            <a:spAutoFit/>
-          </a:bodyPr>
-          <a:lstStyle/>
-          <a:p>
-            <a:r>
-              <a:rPr lang="en-US" dirty="0">
-                <a:solidFill>
-                  <a:srgbClr val="FF0000"/>
-                </a:solidFill>
-                <a:latin typeface="Arial" panose="020B0604020202020204" pitchFamily="34" charset="0"/>
-                <a:cs typeface="Arial" panose="020B0604020202020204" pitchFamily="34" charset="0"/>
-              </a:rPr>
-              <a:t>Placeholder notes:</a:t>
-            </a:r>
-          </a:p>
-        </p:txBody>
-      </p:sp>
     </p:spTree>
     <p:extLst>
       <p:ext uri="{BB962C8B-B14F-4D97-AF65-F5344CB8AC3E}">
@@ -6992,18 +6899,6 @@
           <a:p>
             <a:r>
               <a:rPr lang="en-US" dirty="0">
-                <a:solidFill>
-                  <a:srgbClr val="FF0000"/>
-                </a:solidFill>
-                <a:latin typeface="Arial" panose="020B0604020202020204" pitchFamily="34" charset="0"/>
-                <a:cs typeface="Arial" panose="020B0604020202020204" pitchFamily="34" charset="0"/>
-              </a:rPr>
-              <a:t>Placeholder notes:</a:t>
-            </a:r>
-          </a:p>
-          <a:p>
-            <a:r>
-              <a:rPr lang="en-US" dirty="0">
                 <a:latin typeface="Arial" panose="020B0604020202020204" pitchFamily="34" charset="0"/>
                 <a:cs typeface="Arial" panose="020B0604020202020204" pitchFamily="34" charset="0"/>
               </a:rPr>
@@ -7036,7 +6931,7 @@
                 <a:latin typeface="Arial" panose="020B0604020202020204" pitchFamily="34" charset="0"/>
                 <a:cs typeface="Arial" panose="020B0604020202020204" pitchFamily="34" charset="0"/>
               </a:rPr>
-              <a:t>Chart.js (radar plot)</a:t>
+              <a:t>Chart.js </a:t>
             </a:r>
           </a:p>
           <a:p>
@@ -7046,7 +6941,7 @@
                 <a:latin typeface="Arial" panose="020B0604020202020204" pitchFamily="34" charset="0"/>
                 <a:cs typeface="Arial" panose="020B0604020202020204" pitchFamily="34" charset="0"/>
               </a:rPr>
-              <a:t>D3.js (bar plots, scatter plots, table data)</a:t>
+              <a:t>D3.js </a:t>
             </a:r>
           </a:p>
           <a:p>
@@ -7221,7 +7116,10 @@
           <a:lstStyle/>
           <a:p>
             <a:r>
-              <a:rPr lang="en-US" dirty="0">
+              <a:rPr lang="en-US" u="sng" dirty="0">
+                <a:solidFill>
+                  <a:srgbClr val="1ED760"/>
+                </a:solidFill>
                 <a:latin typeface="Arial" panose="020B0604020202020204" pitchFamily="34" charset="0"/>
                 <a:cs typeface="Arial" panose="020B0604020202020204" pitchFamily="34" charset="0"/>
               </a:rPr>
@@ -7322,6 +7220,181 @@
     <p:extLst>
       <p:ext uri="{BB962C8B-B14F-4D97-AF65-F5344CB8AC3E}">
         <p14:creationId xmlns:p14="http://schemas.microsoft.com/office/powerpoint/2010/main" val="1994800199"/>
+      </p:ext>
+    </p:extLst>
+  </p:cSld>
+  <p:clrMapOvr>
+    <a:masterClrMapping/>
+  </p:clrMapOvr>
+</p:sld>
+</file>
+
+<file path=ppt/slides/slide6.xml><?xml version="1.0" encoding="utf-8"?>
+<p:sld xmlns:a="http://schemas.openxmlformats.org/drawingml/2006/main" xmlns:r="http://schemas.openxmlformats.org/officeDocument/2006/relationships" xmlns:p="http://schemas.openxmlformats.org/presentationml/2006/main">
+  <p:cSld>
+    <p:spTree>
+      <p:nvGrpSpPr>
+        <p:cNvPr id="1" name=""/>
+        <p:cNvGrpSpPr/>
+        <p:nvPr/>
+      </p:nvGrpSpPr>
+      <p:grpSpPr>
+        <a:xfrm>
+          <a:off x="0" y="0"/>
+          <a:ext cx="0" cy="0"/>
+          <a:chOff x="0" y="0"/>
+          <a:chExt cx="0" cy="0"/>
+        </a:xfrm>
+      </p:grpSpPr>
+      <p:sp>
+        <p:nvSpPr>
+          <p:cNvPr id="2" name="Title 1">
+            <a:extLst>
+              <a:ext uri="{FF2B5EF4-FFF2-40B4-BE49-F238E27FC236}">
+                <a16:creationId xmlns:a16="http://schemas.microsoft.com/office/drawing/2014/main" id="{24476461-32A4-462E-BC61-E632203ABAE9}"/>
+              </a:ext>
+            </a:extLst>
+          </p:cNvPr>
+          <p:cNvSpPr>
+            <a:spLocks noGrp="1"/>
+          </p:cNvSpPr>
+          <p:nvPr>
+            <p:ph type="title"/>
+          </p:nvPr>
+        </p:nvSpPr>
+        <p:spPr/>
+        <p:txBody>
+          <a:bodyPr/>
+          <a:lstStyle/>
+          <a:p>
+            <a:r>
+              <a:rPr lang="en-US" dirty="0">
+                <a:latin typeface="Arial" panose="020B0604020202020204" pitchFamily="34" charset="0"/>
+                <a:cs typeface="Arial" panose="020B0604020202020204" pitchFamily="34" charset="0"/>
+              </a:rPr>
+              <a:t>Questions</a:t>
+            </a:r>
+          </a:p>
+        </p:txBody>
+      </p:sp>
+      <p:sp>
+        <p:nvSpPr>
+          <p:cNvPr id="3" name="Content Placeholder 2">
+            <a:extLst>
+              <a:ext uri="{FF2B5EF4-FFF2-40B4-BE49-F238E27FC236}">
+                <a16:creationId xmlns:a16="http://schemas.microsoft.com/office/drawing/2014/main" id="{D9627AE0-0A2E-4D9E-9357-43694BDCA25C}"/>
+              </a:ext>
+            </a:extLst>
+          </p:cNvPr>
+          <p:cNvSpPr>
+            <a:spLocks noGrp="1"/>
+          </p:cNvSpPr>
+          <p:nvPr>
+            <p:ph idx="1"/>
+          </p:nvPr>
+        </p:nvSpPr>
+        <p:spPr/>
+        <p:txBody>
+          <a:bodyPr/>
+          <a:lstStyle/>
+          <a:p>
+            <a:endParaRPr lang="en-US" dirty="0">
+              <a:latin typeface="Arial" panose="020B0604020202020204" pitchFamily="34" charset="0"/>
+              <a:cs typeface="Arial" panose="020B0604020202020204" pitchFamily="34" charset="0"/>
+            </a:endParaRPr>
+          </a:p>
+        </p:txBody>
+      </p:sp>
+      <p:pic>
+        <p:nvPicPr>
+          <p:cNvPr id="4" name="Content Placeholder 4" descr="Logo, icon&#10;&#10;Description automatically generated">
+            <a:extLst>
+              <a:ext uri="{FF2B5EF4-FFF2-40B4-BE49-F238E27FC236}">
+                <a16:creationId xmlns:a16="http://schemas.microsoft.com/office/drawing/2014/main" id="{1AED4217-A7B1-4613-9D0F-31B23F9EC655}"/>
+              </a:ext>
+            </a:extLst>
+          </p:cNvPr>
+          <p:cNvPicPr>
+            <a:picLocks noChangeAspect="1"/>
+          </p:cNvPicPr>
+          <p:nvPr/>
+        </p:nvPicPr>
+        <p:blipFill>
+          <a:blip r:embed="rId2">
+            <a:extLst>
+              <a:ext uri="{28A0092B-C50C-407E-A947-70E740481C1C}">
+                <a14:useLocalDpi xmlns:a14="http://schemas.microsoft.com/office/drawing/2010/main" val="0"/>
+              </a:ext>
+            </a:extLst>
+          </a:blip>
+          <a:stretch>
+            <a:fillRect/>
+          </a:stretch>
+        </p:blipFill>
+        <p:spPr>
+          <a:xfrm rot="19651768">
+            <a:off x="10760491" y="5391445"/>
+            <a:ext cx="1393727" cy="1393727"/>
+          </a:xfrm>
+          <a:prstGeom prst="rect">
+            <a:avLst/>
+          </a:prstGeom>
+          <a:effectLst>
+            <a:outerShdw blurRad="25400" dir="17880000">
+              <a:srgbClr val="000000">
+                <a:alpha val="46000"/>
+              </a:srgbClr>
+            </a:outerShdw>
+          </a:effectLst>
+        </p:spPr>
+      </p:pic>
+      <p:cxnSp>
+        <p:nvCxnSpPr>
+          <p:cNvPr id="5" name="Straight Connector 4">
+            <a:extLst>
+              <a:ext uri="{FF2B5EF4-FFF2-40B4-BE49-F238E27FC236}">
+                <a16:creationId xmlns:a16="http://schemas.microsoft.com/office/drawing/2014/main" id="{262EEB82-A382-4AC1-9690-A6BB57044A47}"/>
+              </a:ext>
+            </a:extLst>
+          </p:cNvPr>
+          <p:cNvCxnSpPr>
+            <a:cxnSpLocks/>
+          </p:cNvCxnSpPr>
+          <p:nvPr/>
+        </p:nvCxnSpPr>
+        <p:spPr>
+          <a:xfrm>
+            <a:off x="919900" y="1569201"/>
+            <a:ext cx="10352199" cy="0"/>
+          </a:xfrm>
+          <a:prstGeom prst="line">
+            <a:avLst/>
+          </a:prstGeom>
+          <a:ln>
+            <a:solidFill>
+              <a:srgbClr val="1ED760"/>
+            </a:solidFill>
+          </a:ln>
+        </p:spPr>
+        <p:style>
+          <a:lnRef idx="1">
+            <a:schemeClr val="accent1"/>
+          </a:lnRef>
+          <a:fillRef idx="0">
+            <a:schemeClr val="accent1"/>
+          </a:fillRef>
+          <a:effectRef idx="0">
+            <a:schemeClr val="accent1"/>
+          </a:effectRef>
+          <a:fontRef idx="minor">
+            <a:schemeClr val="tx1"/>
+          </a:fontRef>
+        </p:style>
+      </p:cxnSp>
+    </p:spTree>
+    <p:extLst>
+      <p:ext uri="{BB962C8B-B14F-4D97-AF65-F5344CB8AC3E}">
+        <p14:creationId xmlns:p14="http://schemas.microsoft.com/office/powerpoint/2010/main" val="2927488681"/>
       </p:ext>
     </p:extLst>
   </p:cSld>

</xml_diff>